<commit_message>
2018.2 Whats new update
</commit_message>
<xml_diff>
--- a/docs/presentations/Sage300SDK_2018.2WebSDKOverview.pptx
+++ b/docs/presentations/Sage300SDK_2018.2WebSDKOverview.pptx
@@ -5,7 +5,7 @@
     <p:sldMasterId id="2147483660" r:id="rId1"/>
   </p:sldMasterIdLst>
   <p:notesMasterIdLst>
-    <p:notesMasterId r:id="rId13"/>
+    <p:notesMasterId r:id="rId14"/>
   </p:notesMasterIdLst>
   <p:sldIdLst>
     <p:sldId id="257" r:id="rId2"/>
@@ -17,8 +17,9 @@
     <p:sldId id="271" r:id="rId8"/>
     <p:sldId id="273" r:id="rId9"/>
     <p:sldId id="282" r:id="rId10"/>
-    <p:sldId id="279" r:id="rId11"/>
-    <p:sldId id="265" r:id="rId12"/>
+    <p:sldId id="296" r:id="rId11"/>
+    <p:sldId id="279" r:id="rId12"/>
+    <p:sldId id="265" r:id="rId13"/>
   </p:sldIdLst>
   <p:sldSz cx="12192000" cy="6858000"/>
   <p:notesSz cx="6858000" cy="9144000"/>
@@ -207,7 +208,7 @@
           <a:p>
             <a:fld id="{F8DE098C-C2B2-472C-9728-F51906A9149D}" type="datetimeFigureOut">
               <a:rPr lang="en-US" smtClean="0"/>
-              <a:t>2/15/2018</a:t>
+              <a:t>2/19/2018</a:t>
             </a:fld>
             <a:endParaRPr lang="en-US"/>
           </a:p>
@@ -746,6 +747,147 @@
     </p:spTree>
     <p:extLst>
       <p:ext uri="{BB962C8B-B14F-4D97-AF65-F5344CB8AC3E}">
+        <p14:creationId xmlns:p14="http://schemas.microsoft.com/office/powerpoint/2010/main" val="958842670"/>
+      </p:ext>
+    </p:extLst>
+  </p:cSld>
+  <p:clrMapOvr>
+    <a:masterClrMapping/>
+  </p:clrMapOvr>
+</p:notes>
+</file>
+
+<file path=ppt/notesSlides/notesSlide11.xml><?xml version="1.0" encoding="utf-8"?>
+<p:notes xmlns:a="http://schemas.openxmlformats.org/drawingml/2006/main" xmlns:r="http://schemas.openxmlformats.org/officeDocument/2006/relationships" xmlns:p="http://schemas.openxmlformats.org/presentationml/2006/main">
+  <p:cSld>
+    <p:spTree>
+      <p:nvGrpSpPr>
+        <p:cNvPr id="1" name=""/>
+        <p:cNvGrpSpPr/>
+        <p:nvPr/>
+      </p:nvGrpSpPr>
+      <p:grpSpPr>
+        <a:xfrm>
+          <a:off x="0" y="0"/>
+          <a:ext cx="0" cy="0"/>
+          <a:chOff x="0" y="0"/>
+          <a:chExt cx="0" cy="0"/>
+        </a:xfrm>
+      </p:grpSpPr>
+      <p:sp>
+        <p:nvSpPr>
+          <p:cNvPr id="2" name="Slide Image Placeholder 1"/>
+          <p:cNvSpPr>
+            <a:spLocks noGrp="1" noRot="1" noChangeAspect="1"/>
+          </p:cNvSpPr>
+          <p:nvPr>
+            <p:ph type="sldImg"/>
+          </p:nvPr>
+        </p:nvSpPr>
+        <p:spPr/>
+      </p:sp>
+      <p:sp>
+        <p:nvSpPr>
+          <p:cNvPr id="3" name="Notes Placeholder 2"/>
+          <p:cNvSpPr>
+            <a:spLocks noGrp="1"/>
+          </p:cNvSpPr>
+          <p:nvPr>
+            <p:ph type="body" idx="1"/>
+          </p:nvPr>
+        </p:nvSpPr>
+        <p:spPr/>
+        <p:txBody>
+          <a:bodyPr/>
+          <a:lstStyle/>
+          <a:p>
+            <a:endParaRPr lang="en-US" dirty="0"/>
+          </a:p>
+          <a:p>
+            <a:endParaRPr lang="en-US" dirty="0"/>
+          </a:p>
+        </p:txBody>
+      </p:sp>
+      <p:sp>
+        <p:nvSpPr>
+          <p:cNvPr id="4" name="Slide Number Placeholder 3"/>
+          <p:cNvSpPr>
+            <a:spLocks noGrp="1"/>
+          </p:cNvSpPr>
+          <p:nvPr>
+            <p:ph type="sldNum" sz="quarter" idx="10"/>
+          </p:nvPr>
+        </p:nvSpPr>
+        <p:spPr/>
+        <p:txBody>
+          <a:bodyPr/>
+          <a:lstStyle/>
+          <a:p>
+            <a:pPr marL="0" marR="0" lvl="0" indent="0" defTabSz="914400" eaLnBrk="1" fontAlgn="auto" latinLnBrk="0" hangingPunct="1">
+              <a:lnSpc>
+                <a:spcPct val="100000"/>
+              </a:lnSpc>
+              <a:spcBef>
+                <a:spcPts val="0"/>
+              </a:spcBef>
+              <a:spcAft>
+                <a:spcPts val="0"/>
+              </a:spcAft>
+              <a:buClrTx/>
+              <a:buSzTx/>
+              <a:buFontTx/>
+              <a:buNone/>
+              <a:tabLst/>
+              <a:defRPr/>
+            </a:pPr>
+            <a:fld id="{AB69E77B-23F2-4D26-B3FA-6109AB5D8139}" type="slidenum">
+              <a:rPr kumimoji="0" lang="en-GB" sz="1800" b="0" i="0" u="none" strike="noStrike" kern="0" cap="none" spc="0" normalizeH="0" baseline="0" noProof="0" smtClean="0">
+                <a:ln>
+                  <a:noFill/>
+                </a:ln>
+                <a:solidFill>
+                  <a:prstClr val="black"/>
+                </a:solidFill>
+                <a:effectLst/>
+                <a:uLnTx/>
+                <a:uFillTx/>
+              </a:rPr>
+              <a:pPr marL="0" marR="0" lvl="0" indent="0" defTabSz="914400" eaLnBrk="1" fontAlgn="auto" latinLnBrk="0" hangingPunct="1">
+                <a:lnSpc>
+                  <a:spcPct val="100000"/>
+                </a:lnSpc>
+                <a:spcBef>
+                  <a:spcPts val="0"/>
+                </a:spcBef>
+                <a:spcAft>
+                  <a:spcPts val="0"/>
+                </a:spcAft>
+                <a:buClrTx/>
+                <a:buSzTx/>
+                <a:buFontTx/>
+                <a:buNone/>
+                <a:tabLst/>
+                <a:defRPr/>
+              </a:pPr>
+              <a:t>12</a:t>
+            </a:fld>
+            <a:endParaRPr kumimoji="0" lang="en-GB" sz="1800" b="0" i="0" u="none" strike="noStrike" kern="0" cap="none" spc="0" normalizeH="0" baseline="0" noProof="0">
+              <a:ln>
+                <a:noFill/>
+              </a:ln>
+              <a:solidFill>
+                <a:prstClr val="black"/>
+              </a:solidFill>
+              <a:effectLst/>
+              <a:uLnTx/>
+              <a:uFillTx/>
+            </a:endParaRPr>
+          </a:p>
+        </p:txBody>
+      </p:sp>
+    </p:spTree>
+    <p:extLst>
+      <p:ext uri="{BB962C8B-B14F-4D97-AF65-F5344CB8AC3E}">
         <p14:creationId xmlns:p14="http://schemas.microsoft.com/office/powerpoint/2010/main" val="250796128"/>
       </p:ext>
     </p:extLst>
@@ -1874,7 +2016,7 @@
     </p:spTree>
     <p:extLst>
       <p:ext uri="{BB962C8B-B14F-4D97-AF65-F5344CB8AC3E}">
-        <p14:creationId xmlns:p14="http://schemas.microsoft.com/office/powerpoint/2010/main" val="958842670"/>
+        <p14:creationId xmlns:p14="http://schemas.microsoft.com/office/powerpoint/2010/main" val="4276886588"/>
       </p:ext>
     </p:extLst>
   </p:cSld>
@@ -1980,7 +2122,7 @@
                 </a:solidFill>
               </a:rPr>
               <a:pPr/>
-              <a:t>2018/02/15</a:t>
+              <a:t>2018/02/19</a:t>
             </a:fld>
             <a:endParaRPr lang="en-US">
               <a:solidFill>
@@ -2285,7 +2427,7 @@
                 </a:solidFill>
               </a:rPr>
               <a:pPr/>
-              <a:t>2018/02/15</a:t>
+              <a:t>2018/02/19</a:t>
             </a:fld>
             <a:endParaRPr lang="en-US">
               <a:solidFill>
@@ -2522,7 +2664,7 @@
             <a:fld id="{EE1C84F4-270C-2249-89D9-A705BDADDAAB}" type="datetime1">
               <a:rPr lang="en-ZA" smtClean="0"/>
               <a:pPr/>
-              <a:t>2018/02/15</a:t>
+              <a:t>2018/02/19</a:t>
             </a:fld>
             <a:endParaRPr lang="en-US"/>
           </a:p>
@@ -2861,7 +3003,7 @@
             <a:fld id="{2AE6851E-022E-D141-8BE0-1745E9557F71}" type="datetime1">
               <a:rPr lang="en-ZA" smtClean="0"/>
               <a:pPr/>
-              <a:t>2018/02/15</a:t>
+              <a:t>2018/02/19</a:t>
             </a:fld>
             <a:endParaRPr lang="en-US"/>
           </a:p>
@@ -3485,6 +3627,195 @@
           <a:p>
             <a:r>
               <a:rPr lang="en-US" dirty="0"/>
+              <a:t>AR Invoice Entry Customization Sample</a:t>
+            </a:r>
+          </a:p>
+        </p:txBody>
+      </p:sp>
+      <p:sp>
+        <p:nvSpPr>
+          <p:cNvPr id="12" name="Content Placeholder 4"/>
+          <p:cNvSpPr>
+            <a:spLocks noGrp="1"/>
+          </p:cNvSpPr>
+          <p:nvPr>
+            <p:ph idx="1"/>
+          </p:nvPr>
+        </p:nvSpPr>
+        <p:spPr>
+          <a:xfrm>
+            <a:off x="466025" y="1366943"/>
+            <a:ext cx="3521360" cy="4916411"/>
+          </a:xfrm>
+        </p:spPr>
+        <p:txBody>
+          <a:bodyPr numCol="1"/>
+          <a:lstStyle/>
+          <a:p>
+            <a:pPr lvl="1">
+              <a:lnSpc>
+                <a:spcPct val="100000"/>
+              </a:lnSpc>
+            </a:pPr>
+            <a:r>
+              <a:rPr lang="en-US" sz="2400" dirty="0"/>
+              <a:t>Add Payment Code screen functionality to new tab page</a:t>
+            </a:r>
+          </a:p>
+          <a:p>
+            <a:pPr lvl="1">
+              <a:lnSpc>
+                <a:spcPct val="100000"/>
+              </a:lnSpc>
+            </a:pPr>
+            <a:r>
+              <a:rPr lang="en-US" sz="2400" dirty="0"/>
+              <a:t>Highlights</a:t>
+            </a:r>
+          </a:p>
+          <a:p>
+            <a:pPr lvl="2">
+              <a:lnSpc>
+                <a:spcPct val="100000"/>
+              </a:lnSpc>
+            </a:pPr>
+            <a:r>
+              <a:rPr lang="en-US" sz="2000" dirty="0"/>
+              <a:t>Add a tab control</a:t>
+            </a:r>
+          </a:p>
+          <a:p>
+            <a:pPr lvl="2">
+              <a:lnSpc>
+                <a:spcPct val="100000"/>
+              </a:lnSpc>
+            </a:pPr>
+            <a:r>
+              <a:rPr lang="en-US" sz="2000" dirty="0"/>
+              <a:t>Enhance display via CSS</a:t>
+            </a:r>
+          </a:p>
+          <a:p>
+            <a:pPr lvl="2">
+              <a:lnSpc>
+                <a:spcPct val="100000"/>
+              </a:lnSpc>
+            </a:pPr>
+            <a:r>
+              <a:rPr lang="en-US" sz="2000" dirty="0"/>
+              <a:t>Populate dropdown list</a:t>
+            </a:r>
+          </a:p>
+          <a:p>
+            <a:pPr lvl="2">
+              <a:lnSpc>
+                <a:spcPct val="100000"/>
+              </a:lnSpc>
+            </a:pPr>
+            <a:r>
+              <a:rPr lang="en-US" sz="2000" dirty="0"/>
+              <a:t>Populate grid with Finder method</a:t>
+            </a:r>
+          </a:p>
+          <a:p>
+            <a:pPr lvl="2">
+              <a:lnSpc>
+                <a:spcPct val="100000"/>
+              </a:lnSpc>
+            </a:pPr>
+            <a:r>
+              <a:rPr lang="en-US" sz="2000" dirty="0"/>
+              <a:t>Save, Delete, Update, Grid Refresh</a:t>
+            </a:r>
+          </a:p>
+        </p:txBody>
+      </p:sp>
+      <p:pic>
+        <p:nvPicPr>
+          <p:cNvPr id="5" name="Picture 4" descr="cid:image001.png@01D3A647.F9CFCB70">
+            <a:extLst>
+              <a:ext uri="{FF2B5EF4-FFF2-40B4-BE49-F238E27FC236}">
+                <a16:creationId xmlns:a16="http://schemas.microsoft.com/office/drawing/2014/main" id="{6511B2A5-6750-4947-AED0-C7894EB67BD1}"/>
+              </a:ext>
+            </a:extLst>
+          </p:cNvPr>
+          <p:cNvPicPr/>
+          <p:nvPr/>
+        </p:nvPicPr>
+        <p:blipFill>
+          <a:blip r:embed="rId3" r:link="rId4" cstate="print">
+            <a:extLst>
+              <a:ext uri="{28A0092B-C50C-407E-A947-70E740481C1C}">
+                <a14:useLocalDpi xmlns:a14="http://schemas.microsoft.com/office/drawing/2010/main" val="0"/>
+              </a:ext>
+            </a:extLst>
+          </a:blip>
+          <a:srcRect/>
+          <a:stretch>
+            <a:fillRect/>
+          </a:stretch>
+        </p:blipFill>
+        <p:spPr bwMode="auto">
+          <a:xfrm>
+            <a:off x="4551296" y="1360487"/>
+            <a:ext cx="6983565" cy="4981590"/>
+          </a:xfrm>
+          <a:prstGeom prst="rect">
+            <a:avLst/>
+          </a:prstGeom>
+          <a:noFill/>
+          <a:ln>
+            <a:noFill/>
+          </a:ln>
+        </p:spPr>
+      </p:pic>
+    </p:spTree>
+    <p:extLst>
+      <p:ext uri="{BB962C8B-B14F-4D97-AF65-F5344CB8AC3E}">
+        <p14:creationId xmlns:p14="http://schemas.microsoft.com/office/powerpoint/2010/main" val="3986338698"/>
+      </p:ext>
+    </p:extLst>
+  </p:cSld>
+  <p:clrMapOvr>
+    <a:masterClrMapping/>
+  </p:clrMapOvr>
+</p:sld>
+</file>
+
+<file path=ppt/slides/slide11.xml><?xml version="1.0" encoding="utf-8"?>
+<p:sld xmlns:a="http://schemas.openxmlformats.org/drawingml/2006/main" xmlns:r="http://schemas.openxmlformats.org/officeDocument/2006/relationships" xmlns:p="http://schemas.openxmlformats.org/presentationml/2006/main">
+  <p:cSld>
+    <p:spTree>
+      <p:nvGrpSpPr>
+        <p:cNvPr id="1" name=""/>
+        <p:cNvGrpSpPr/>
+        <p:nvPr/>
+      </p:nvGrpSpPr>
+      <p:grpSpPr>
+        <a:xfrm>
+          <a:off x="0" y="0"/>
+          <a:ext cx="0" cy="0"/>
+          <a:chOff x="0" y="0"/>
+          <a:chExt cx="0" cy="0"/>
+        </a:xfrm>
+      </p:grpSpPr>
+      <p:sp>
+        <p:nvSpPr>
+          <p:cNvPr id="8" name="Title 7"/>
+          <p:cNvSpPr>
+            <a:spLocks noGrp="1"/>
+          </p:cNvSpPr>
+          <p:nvPr>
+            <p:ph type="title"/>
+          </p:nvPr>
+        </p:nvSpPr>
+        <p:spPr/>
+        <p:txBody>
+          <a:bodyPr/>
+          <a:lstStyle/>
+          <a:p>
+            <a:r>
+              <a:rPr lang="en-US" dirty="0"/>
               <a:t>Upgrade Wizard</a:t>
             </a:r>
           </a:p>
@@ -3538,7 +3869,7 @@
 </p:sld>
 </file>
 
-<file path=ppt/slides/slide11.xml><?xml version="1.0" encoding="utf-8"?>
+<file path=ppt/slides/slide12.xml><?xml version="1.0" encoding="utf-8"?>
 <p:sld xmlns:a="http://schemas.openxmlformats.org/drawingml/2006/main" xmlns:r="http://schemas.openxmlformats.org/officeDocument/2006/relationships" xmlns:p="http://schemas.openxmlformats.org/presentationml/2006/main">
   <p:cSld>
     <p:spTree>
@@ -4707,22 +5038,22 @@
             <a:pPr lvl="1"/>
             <a:r>
               <a:rPr lang="en-US" sz="2400" dirty="0"/>
-              <a:t>New Sage300SDK_JavaScriptMinification.docx in </a:t>
-            </a:r>
-            <a:r>
-              <a:rPr lang="en-US" sz="2400" b="1" dirty="0"/>
-              <a:t>docs\development</a:t>
-            </a:r>
-          </a:p>
-          <a:p>
-            <a:pPr lvl="1"/>
-            <a:r>
-              <a:rPr lang="en-US" sz="2400" dirty="0"/>
               <a:t>New Sage300SDK_InquiryConfigurationWizard.docx in </a:t>
             </a:r>
             <a:r>
               <a:rPr lang="en-US" sz="2400" b="1" dirty="0"/>
               <a:t>docs\wizards</a:t>
+            </a:r>
+          </a:p>
+          <a:p>
+            <a:pPr lvl="1"/>
+            <a:r>
+              <a:rPr lang="en-US" sz="2400" dirty="0"/>
+              <a:t>New Sample4_AR_Invoice_Entry_Customization.docx in </a:t>
+            </a:r>
+            <a:r>
+              <a:rPr lang="en-US" sz="2400" b="1" dirty="0"/>
+              <a:t>samples\customization\Sample4_AR_Invoice_Entry_Customization</a:t>
             </a:r>
           </a:p>
           <a:p>

</xml_diff>

<commit_message>
2018.2 Removed the Inquiry Wizard until 2019
</commit_message>
<xml_diff>
--- a/docs/presentations/Sage300SDK_2018.2WebSDKOverview.pptx
+++ b/docs/presentations/Sage300SDK_2018.2WebSDKOverview.pptx
@@ -5,7 +5,7 @@
     <p:sldMasterId id="2147483660" r:id="rId1"/>
   </p:sldMasterIdLst>
   <p:notesMasterIdLst>
-    <p:notesMasterId r:id="rId14"/>
+    <p:notesMasterId r:id="rId13"/>
   </p:notesMasterIdLst>
   <p:sldIdLst>
     <p:sldId id="257" r:id="rId2"/>
@@ -17,9 +17,8 @@
     <p:sldId id="294" r:id="rId8"/>
     <p:sldId id="271" r:id="rId9"/>
     <p:sldId id="273" r:id="rId10"/>
-    <p:sldId id="282" r:id="rId11"/>
-    <p:sldId id="296" r:id="rId12"/>
-    <p:sldId id="265" r:id="rId13"/>
+    <p:sldId id="296" r:id="rId11"/>
+    <p:sldId id="265" r:id="rId12"/>
   </p:sldIdLst>
   <p:sldSz cx="12192000" cy="6858000"/>
   <p:notesSz cx="6858000" cy="9144000"/>
@@ -208,7 +207,7 @@
           <a:p>
             <a:fld id="{F8DE098C-C2B2-472C-9728-F51906A9149D}" type="datetimeFigureOut">
               <a:rPr lang="en-US" smtClean="0"/>
-              <a:t>4/16/2018</a:t>
+              <a:t>4/23/2018</a:t>
             </a:fld>
             <a:endParaRPr lang="en-US"/>
           </a:p>
@@ -747,147 +746,6 @@
     </p:spTree>
     <p:extLst>
       <p:ext uri="{BB962C8B-B14F-4D97-AF65-F5344CB8AC3E}">
-        <p14:creationId xmlns:p14="http://schemas.microsoft.com/office/powerpoint/2010/main" val="4276886588"/>
-      </p:ext>
-    </p:extLst>
-  </p:cSld>
-  <p:clrMapOvr>
-    <a:masterClrMapping/>
-  </p:clrMapOvr>
-</p:notes>
-</file>
-
-<file path=ppt/notesSlides/notesSlide11.xml><?xml version="1.0" encoding="utf-8"?>
-<p:notes xmlns:a="http://schemas.openxmlformats.org/drawingml/2006/main" xmlns:r="http://schemas.openxmlformats.org/officeDocument/2006/relationships" xmlns:p="http://schemas.openxmlformats.org/presentationml/2006/main">
-  <p:cSld>
-    <p:spTree>
-      <p:nvGrpSpPr>
-        <p:cNvPr id="1" name=""/>
-        <p:cNvGrpSpPr/>
-        <p:nvPr/>
-      </p:nvGrpSpPr>
-      <p:grpSpPr>
-        <a:xfrm>
-          <a:off x="0" y="0"/>
-          <a:ext cx="0" cy="0"/>
-          <a:chOff x="0" y="0"/>
-          <a:chExt cx="0" cy="0"/>
-        </a:xfrm>
-      </p:grpSpPr>
-      <p:sp>
-        <p:nvSpPr>
-          <p:cNvPr id="2" name="Slide Image Placeholder 1"/>
-          <p:cNvSpPr>
-            <a:spLocks noGrp="1" noRot="1" noChangeAspect="1"/>
-          </p:cNvSpPr>
-          <p:nvPr>
-            <p:ph type="sldImg"/>
-          </p:nvPr>
-        </p:nvSpPr>
-        <p:spPr/>
-      </p:sp>
-      <p:sp>
-        <p:nvSpPr>
-          <p:cNvPr id="3" name="Notes Placeholder 2"/>
-          <p:cNvSpPr>
-            <a:spLocks noGrp="1"/>
-          </p:cNvSpPr>
-          <p:nvPr>
-            <p:ph type="body" idx="1"/>
-          </p:nvPr>
-        </p:nvSpPr>
-        <p:spPr/>
-        <p:txBody>
-          <a:bodyPr/>
-          <a:lstStyle/>
-          <a:p>
-            <a:endParaRPr lang="en-US" dirty="0"/>
-          </a:p>
-          <a:p>
-            <a:endParaRPr lang="en-US" dirty="0"/>
-          </a:p>
-        </p:txBody>
-      </p:sp>
-      <p:sp>
-        <p:nvSpPr>
-          <p:cNvPr id="4" name="Slide Number Placeholder 3"/>
-          <p:cNvSpPr>
-            <a:spLocks noGrp="1"/>
-          </p:cNvSpPr>
-          <p:nvPr>
-            <p:ph type="sldNum" sz="quarter" idx="10"/>
-          </p:nvPr>
-        </p:nvSpPr>
-        <p:spPr/>
-        <p:txBody>
-          <a:bodyPr/>
-          <a:lstStyle/>
-          <a:p>
-            <a:pPr marL="0" marR="0" lvl="0" indent="0" defTabSz="914400" eaLnBrk="1" fontAlgn="auto" latinLnBrk="0" hangingPunct="1">
-              <a:lnSpc>
-                <a:spcPct val="100000"/>
-              </a:lnSpc>
-              <a:spcBef>
-                <a:spcPts val="0"/>
-              </a:spcBef>
-              <a:spcAft>
-                <a:spcPts val="0"/>
-              </a:spcAft>
-              <a:buClrTx/>
-              <a:buSzTx/>
-              <a:buFontTx/>
-              <a:buNone/>
-              <a:tabLst/>
-              <a:defRPr/>
-            </a:pPr>
-            <a:fld id="{AB69E77B-23F2-4D26-B3FA-6109AB5D8139}" type="slidenum">
-              <a:rPr kumimoji="0" lang="en-GB" sz="1800" b="0" i="0" u="none" strike="noStrike" kern="0" cap="none" spc="0" normalizeH="0" baseline="0" noProof="0" smtClean="0">
-                <a:ln>
-                  <a:noFill/>
-                </a:ln>
-                <a:solidFill>
-                  <a:prstClr val="black"/>
-                </a:solidFill>
-                <a:effectLst/>
-                <a:uLnTx/>
-                <a:uFillTx/>
-              </a:rPr>
-              <a:pPr marL="0" marR="0" lvl="0" indent="0" defTabSz="914400" eaLnBrk="1" fontAlgn="auto" latinLnBrk="0" hangingPunct="1">
-                <a:lnSpc>
-                  <a:spcPct val="100000"/>
-                </a:lnSpc>
-                <a:spcBef>
-                  <a:spcPts val="0"/>
-                </a:spcBef>
-                <a:spcAft>
-                  <a:spcPts val="0"/>
-                </a:spcAft>
-                <a:buClrTx/>
-                <a:buSzTx/>
-                <a:buFontTx/>
-                <a:buNone/>
-                <a:tabLst/>
-                <a:defRPr/>
-              </a:pPr>
-              <a:t>12</a:t>
-            </a:fld>
-            <a:endParaRPr kumimoji="0" lang="en-GB" sz="1800" b="0" i="0" u="none" strike="noStrike" kern="0" cap="none" spc="0" normalizeH="0" baseline="0" noProof="0">
-              <a:ln>
-                <a:noFill/>
-              </a:ln>
-              <a:solidFill>
-                <a:prstClr val="black"/>
-              </a:solidFill>
-              <a:effectLst/>
-              <a:uLnTx/>
-              <a:uFillTx/>
-            </a:endParaRPr>
-          </a:p>
-        </p:txBody>
-      </p:sp>
-    </p:spTree>
-    <p:extLst>
-      <p:ext uri="{BB962C8B-B14F-4D97-AF65-F5344CB8AC3E}">
         <p14:creationId xmlns:p14="http://schemas.microsoft.com/office/powerpoint/2010/main" val="250796128"/>
       </p:ext>
     </p:extLst>
@@ -2016,7 +1874,7 @@
     </p:spTree>
     <p:extLst>
       <p:ext uri="{BB962C8B-B14F-4D97-AF65-F5344CB8AC3E}">
-        <p14:creationId xmlns:p14="http://schemas.microsoft.com/office/powerpoint/2010/main" val="576520345"/>
+        <p14:creationId xmlns:p14="http://schemas.microsoft.com/office/powerpoint/2010/main" val="4276886588"/>
       </p:ext>
     </p:extLst>
   </p:cSld>
@@ -2122,7 +1980,7 @@
                 </a:solidFill>
               </a:rPr>
               <a:pPr/>
-              <a:t>2018/04/16</a:t>
+              <a:t>2018/04/23</a:t>
             </a:fld>
             <a:endParaRPr lang="en-US">
               <a:solidFill>
@@ -2427,7 +2285,7 @@
                 </a:solidFill>
               </a:rPr>
               <a:pPr/>
-              <a:t>2018/04/16</a:t>
+              <a:t>2018/04/23</a:t>
             </a:fld>
             <a:endParaRPr lang="en-US">
               <a:solidFill>
@@ -2664,7 +2522,7 @@
             <a:fld id="{EE1C84F4-270C-2249-89D9-A705BDADDAAB}" type="datetime1">
               <a:rPr lang="en-ZA" smtClean="0"/>
               <a:pPr/>
-              <a:t>2018/04/16</a:t>
+              <a:t>2018/04/23</a:t>
             </a:fld>
             <a:endParaRPr lang="en-US"/>
           </a:p>
@@ -3003,7 +2861,7 @@
             <a:fld id="{2AE6851E-022E-D141-8BE0-1745E9557F71}" type="datetime1">
               <a:rPr lang="en-ZA" smtClean="0"/>
               <a:pPr/>
-              <a:t>2018/04/16</a:t>
+              <a:t>2018/04/23</a:t>
             </a:fld>
             <a:endParaRPr lang="en-US"/>
           </a:p>
@@ -3627,243 +3485,6 @@
           <a:p>
             <a:r>
               <a:rPr lang="en-US" dirty="0"/>
-              <a:t>Inquiry Configuration Wizard</a:t>
-            </a:r>
-          </a:p>
-        </p:txBody>
-      </p:sp>
-      <p:sp>
-        <p:nvSpPr>
-          <p:cNvPr id="12" name="Content Placeholder 4"/>
-          <p:cNvSpPr>
-            <a:spLocks noGrp="1"/>
-          </p:cNvSpPr>
-          <p:nvPr>
-            <p:ph idx="1"/>
-          </p:nvPr>
-        </p:nvSpPr>
-        <p:spPr>
-          <a:xfrm>
-            <a:off x="466025" y="1366944"/>
-            <a:ext cx="3521360" cy="3333072"/>
-          </a:xfrm>
-        </p:spPr>
-        <p:txBody>
-          <a:bodyPr numCol="1"/>
-          <a:lstStyle/>
-          <a:p>
-            <a:pPr lvl="1">
-              <a:lnSpc>
-                <a:spcPct val="100000"/>
-              </a:lnSpc>
-            </a:pPr>
-            <a:r>
-              <a:rPr lang="en-US" sz="2400" dirty="0"/>
-              <a:t>Creates JSON configuration files</a:t>
-            </a:r>
-          </a:p>
-          <a:p>
-            <a:pPr lvl="1">
-              <a:lnSpc>
-                <a:spcPct val="100000"/>
-              </a:lnSpc>
-            </a:pPr>
-            <a:r>
-              <a:rPr lang="en-US" sz="2400" dirty="0"/>
-              <a:t>To be used by the new Inquiry Engine in 2019</a:t>
-            </a:r>
-          </a:p>
-          <a:p>
-            <a:pPr lvl="2">
-              <a:lnSpc>
-                <a:spcPct val="100000"/>
-              </a:lnSpc>
-            </a:pPr>
-            <a:r>
-              <a:rPr lang="en-US" sz="2000" dirty="0"/>
-              <a:t>Generic Inquiry</a:t>
-            </a:r>
-          </a:p>
-          <a:p>
-            <a:pPr lvl="2">
-              <a:lnSpc>
-                <a:spcPct val="100000"/>
-              </a:lnSpc>
-            </a:pPr>
-            <a:r>
-              <a:rPr lang="en-US" sz="2000" dirty="0"/>
-              <a:t>Adhoc Inquiry</a:t>
-            </a:r>
-          </a:p>
-          <a:p>
-            <a:pPr lvl="1">
-              <a:lnSpc>
-                <a:spcPct val="100000"/>
-              </a:lnSpc>
-            </a:pPr>
-            <a:r>
-              <a:rPr lang="en-US" sz="2400" dirty="0"/>
-              <a:t>Data sources are Business Views or SQL Statements</a:t>
-            </a:r>
-          </a:p>
-          <a:p>
-            <a:pPr lvl="1">
-              <a:lnSpc>
-                <a:spcPct val="100000"/>
-              </a:lnSpc>
-            </a:pPr>
-            <a:r>
-              <a:rPr lang="en-US" sz="2400" dirty="0"/>
-              <a:t>Fast Grid display!</a:t>
-            </a:r>
-          </a:p>
-          <a:p>
-            <a:pPr lvl="1">
-              <a:lnSpc>
-                <a:spcPct val="100000"/>
-              </a:lnSpc>
-            </a:pPr>
-            <a:r>
-              <a:rPr lang="en-US" sz="2400" dirty="0">
-                <a:solidFill>
-                  <a:srgbClr val="FF0000"/>
-                </a:solidFill>
-              </a:rPr>
-              <a:t>NOTE: In 2018.2 Web SDK but not used in the application until 2019!</a:t>
-            </a:r>
-          </a:p>
-        </p:txBody>
-      </p:sp>
-      <p:pic>
-        <p:nvPicPr>
-          <p:cNvPr id="3" name="Picture 2">
-            <a:extLst>
-              <a:ext uri="{FF2B5EF4-FFF2-40B4-BE49-F238E27FC236}">
-                <a16:creationId xmlns:a16="http://schemas.microsoft.com/office/drawing/2014/main" id="{9B743708-6653-4157-A1D4-64D8DE10F116}"/>
-              </a:ext>
-            </a:extLst>
-          </p:cNvPr>
-          <p:cNvPicPr>
-            <a:picLocks noChangeAspect="1"/>
-          </p:cNvPicPr>
-          <p:nvPr/>
-        </p:nvPicPr>
-        <p:blipFill>
-          <a:blip r:embed="rId3"/>
-          <a:stretch>
-            <a:fillRect/>
-          </a:stretch>
-        </p:blipFill>
-        <p:spPr>
-          <a:xfrm>
-            <a:off x="4295775" y="1366944"/>
-            <a:ext cx="7633466" cy="4681122"/>
-          </a:xfrm>
-          <a:prstGeom prst="rect">
-            <a:avLst/>
-          </a:prstGeom>
-        </p:spPr>
-      </p:pic>
-      <p:sp>
-        <p:nvSpPr>
-          <p:cNvPr id="4" name="Rectangle 3">
-            <a:extLst>
-              <a:ext uri="{FF2B5EF4-FFF2-40B4-BE49-F238E27FC236}">
-                <a16:creationId xmlns:a16="http://schemas.microsoft.com/office/drawing/2014/main" id="{0CC193DA-2F4E-4451-8178-71B485682BEB}"/>
-              </a:ext>
-            </a:extLst>
-          </p:cNvPr>
-          <p:cNvSpPr/>
-          <p:nvPr/>
-        </p:nvSpPr>
-        <p:spPr>
-          <a:xfrm>
-            <a:off x="4766088" y="4851586"/>
-            <a:ext cx="5756914" cy="923330"/>
-          </a:xfrm>
-          <a:prstGeom prst="rect">
-            <a:avLst/>
-          </a:prstGeom>
-          <a:noFill/>
-        </p:spPr>
-        <p:txBody>
-          <a:bodyPr wrap="square" lIns="91440" tIns="45720" rIns="91440" bIns="45720">
-            <a:spAutoFit/>
-          </a:bodyPr>
-          <a:lstStyle/>
-          <a:p>
-            <a:pPr algn="ctr"/>
-            <a:r>
-              <a:rPr lang="en-US" sz="5400" b="1" cap="none" spc="0" dirty="0">
-                <a:ln w="9525">
-                  <a:solidFill>
-                    <a:schemeClr val="bg1"/>
-                  </a:solidFill>
-                  <a:prstDash val="solid"/>
-                </a:ln>
-                <a:solidFill>
-                  <a:srgbClr val="FF0000"/>
-                </a:solidFill>
-                <a:effectLst>
-                  <a:outerShdw blurRad="12700" dist="38100" dir="2700000" algn="tl" rotWithShape="0">
-                    <a:schemeClr val="bg1">
-                      <a:lumMod val="50000"/>
-                    </a:schemeClr>
-                  </a:outerShdw>
-                </a:effectLst>
-              </a:rPr>
-              <a:t>Preview</a:t>
-            </a:r>
-          </a:p>
-        </p:txBody>
-      </p:sp>
-    </p:spTree>
-    <p:extLst>
-      <p:ext uri="{BB962C8B-B14F-4D97-AF65-F5344CB8AC3E}">
-        <p14:creationId xmlns:p14="http://schemas.microsoft.com/office/powerpoint/2010/main" val="3756481654"/>
-      </p:ext>
-    </p:extLst>
-  </p:cSld>
-  <p:clrMapOvr>
-    <a:masterClrMapping/>
-  </p:clrMapOvr>
-</p:sld>
-</file>
-
-<file path=ppt/slides/slide11.xml><?xml version="1.0" encoding="utf-8"?>
-<p:sld xmlns:a="http://schemas.openxmlformats.org/drawingml/2006/main" xmlns:r="http://schemas.openxmlformats.org/officeDocument/2006/relationships" xmlns:p="http://schemas.openxmlformats.org/presentationml/2006/main">
-  <p:cSld>
-    <p:spTree>
-      <p:nvGrpSpPr>
-        <p:cNvPr id="1" name=""/>
-        <p:cNvGrpSpPr/>
-        <p:nvPr/>
-      </p:nvGrpSpPr>
-      <p:grpSpPr>
-        <a:xfrm>
-          <a:off x="0" y="0"/>
-          <a:ext cx="0" cy="0"/>
-          <a:chOff x="0" y="0"/>
-          <a:chExt cx="0" cy="0"/>
-        </a:xfrm>
-      </p:grpSpPr>
-      <p:sp>
-        <p:nvSpPr>
-          <p:cNvPr id="8" name="Title 7"/>
-          <p:cNvSpPr>
-            <a:spLocks noGrp="1"/>
-          </p:cNvSpPr>
-          <p:nvPr>
-            <p:ph type="title"/>
-          </p:nvPr>
-        </p:nvSpPr>
-        <p:spPr/>
-        <p:txBody>
-          <a:bodyPr/>
-          <a:lstStyle/>
-          <a:p>
-            <a:r>
-              <a:rPr lang="en-US" dirty="0"/>
               <a:t>AR Invoice Entry Customization Sample</a:t>
             </a:r>
           </a:p>
@@ -4019,7 +3640,7 @@
 </p:sld>
 </file>
 
-<file path=ppt/slides/slide12.xml><?xml version="1.0" encoding="utf-8"?>
+<file path=ppt/slides/slide11.xml><?xml version="1.0" encoding="utf-8"?>
 <p:sld xmlns:a="http://schemas.openxmlformats.org/drawingml/2006/main" xmlns:r="http://schemas.openxmlformats.org/officeDocument/2006/relationships" xmlns:p="http://schemas.openxmlformats.org/presentationml/2006/main">
   <p:cSld>
     <p:spTree>

</xml_diff>